<commit_message>
update ch00 & ch01
</commit_message>
<xml_diff>
--- a/materials/slides/chapt00.pptx
+++ b/materials/slides/chapt00.pptx
@@ -239,8 +239,8 @@
               <c:idx val="0"/>
               <c:layout>
                 <c:manualLayout>
-                  <c:x val="-0.24051888971400839"/>
-                  <c:y val="-2.6497529314924679E-2"/>
+                  <c:x val="-0.19967547465486291"/>
+                  <c:y val="9.9766850400460558E-2"/>
                 </c:manualLayout>
               </c:layout>
               <c:tx>
@@ -274,7 +274,7 @@
                           <a:schemeClr val="bg1"/>
                         </a:solidFill>
                       </a:rPr>
-                      <a:t>50%</a:t>
+                      <a:t>40%</a:t>
                     </a:r>
                   </a:p>
                 </c:rich>
@@ -297,8 +297,8 @@
               <c:idx val="1"/>
               <c:layout>
                 <c:manualLayout>
-                  <c:x val="0.20146211824417168"/>
-                  <c:y val="-0.21419605523628688"/>
+                  <c:x val="0.36669229734707842"/>
+                  <c:y val="-0.51883392375594628"/>
                 </c:manualLayout>
               </c:layout>
               <c:tx>
@@ -332,8 +332,13 @@
                           <a:schemeClr val="bg1"/>
                         </a:solidFill>
                       </a:rPr>
-                      <a:t>20%</a:t>
+                      <a:t>5%</a:t>
                     </a:r>
+                    <a:endParaRPr lang="zh-CN" altLang="en-US">
+                      <a:solidFill>
+                        <a:schemeClr val="bg1"/>
+                      </a:solidFill>
+                    </a:endParaRPr>
                   </a:p>
                 </c:rich>
               </c:tx>
@@ -355,8 +360,8 @@
               <c:idx val="2"/>
               <c:layout>
                 <c:manualLayout>
-                  <c:x val="0.25193399563791158"/>
-                  <c:y val="0.19583856212946041"/>
+                  <c:x val="-6.3674211637303454E-2"/>
+                  <c:y val="0.52452678869014546"/>
                 </c:manualLayout>
               </c:layout>
               <c:tx>
@@ -381,7 +386,7 @@
                           <a:schemeClr val="bg1"/>
                         </a:solidFill>
                       </a:rPr>
-                      <a:t>期中考试
+                      <a:t>作业成绩
 </a:t>
                     </a:r>
                     <a:r>
@@ -390,8 +395,13 @@
                           <a:schemeClr val="bg1"/>
                         </a:solidFill>
                       </a:rPr>
-                      <a:t>30%</a:t>
+                      <a:t>55%</a:t>
                     </a:r>
+                    <a:endParaRPr lang="zh-CN" altLang="en-US">
+                      <a:solidFill>
+                        <a:schemeClr val="bg1"/>
+                      </a:solidFill>
+                    </a:endParaRPr>
                   </a:p>
                 </c:rich>
               </c:tx>
@@ -490,13 +500,13 @@
               <c:strCache>
                 <c:ptCount val="3"/>
                 <c:pt idx="0">
-                  <c:v>期末考试</c:v>
+                  <c:v>期末成绩</c:v>
                 </c:pt>
                 <c:pt idx="1">
-                  <c:v>平时成绩</c:v>
+                  <c:v>作业成绩</c:v>
                 </c:pt>
                 <c:pt idx="2">
-                  <c:v>期中考试</c:v>
+                  <c:v>平时成绩</c:v>
                 </c:pt>
               </c:strCache>
             </c:strRef>
@@ -508,13 +518,13 @@
                 <c:formatCode>General</c:formatCode>
                 <c:ptCount val="4"/>
                 <c:pt idx="0">
-                  <c:v>5</c:v>
+                  <c:v>4</c:v>
                 </c:pt>
                 <c:pt idx="1">
-                  <c:v>2</c:v>
+                  <c:v>5.5</c:v>
                 </c:pt>
                 <c:pt idx="2">
-                  <c:v>3</c:v>
+                  <c:v>0.5</c:v>
                 </c:pt>
               </c:numCache>
             </c:numRef>
@@ -7481,7 +7491,7 @@
               <a:pPr>
                 <a:defRPr/>
               </a:pPr>
-              <a:t>2/24/2018</a:t>
+              <a:t>2/25/2019</a:t>
             </a:fld>
             <a:endParaRPr/>
           </a:p>
@@ -7701,7 +7711,7 @@
               <a:pPr>
                 <a:defRPr/>
               </a:pPr>
-              <a:t>2/24/2018</a:t>
+              <a:t>2/25/2019</a:t>
             </a:fld>
             <a:endParaRPr/>
           </a:p>
@@ -8304,7 +8314,7 @@
               <a:pPr>
                 <a:defRPr/>
               </a:pPr>
-              <a:t>2/24/2018</a:t>
+              <a:t>2/25/2019</a:t>
             </a:fld>
             <a:endParaRPr/>
           </a:p>
@@ -8558,7 +8568,7 @@
               <a:pPr>
                 <a:defRPr/>
               </a:pPr>
-              <a:t>2/24/2018</a:t>
+              <a:t>2/25/2019</a:t>
             </a:fld>
             <a:endParaRPr/>
           </a:p>
@@ -8770,7 +8780,7 @@
               <a:pPr>
                 <a:defRPr/>
               </a:pPr>
-              <a:t>2/24/2018</a:t>
+              <a:t>2/25/2019</a:t>
             </a:fld>
             <a:endParaRPr/>
           </a:p>
@@ -8953,7 +8963,7 @@
               <a:pPr>
                 <a:defRPr/>
               </a:pPr>
-              <a:t>2/24/2018</a:t>
+              <a:t>2/25/2019</a:t>
             </a:fld>
             <a:endParaRPr/>
           </a:p>
@@ -9196,7 +9206,7 @@
               <a:pPr>
                 <a:defRPr/>
               </a:pPr>
-              <a:t>2/24/2018</a:t>
+              <a:t>2/25/2019</a:t>
             </a:fld>
             <a:endParaRPr/>
           </a:p>
@@ -9625,7 +9635,7 @@
               <a:pPr>
                 <a:defRPr/>
               </a:pPr>
-              <a:t>2/24/2018</a:t>
+              <a:t>2/25/2019</a:t>
             </a:fld>
             <a:endParaRPr/>
           </a:p>
@@ -10037,7 +10047,7 @@
               <a:pPr>
                 <a:defRPr/>
               </a:pPr>
-              <a:t>2/24/2018</a:t>
+              <a:t>2/25/2019</a:t>
             </a:fld>
             <a:endParaRPr/>
           </a:p>
@@ -10153,7 +10163,7 @@
               <a:pPr>
                 <a:defRPr/>
               </a:pPr>
-              <a:t>2/24/2018</a:t>
+              <a:t>2/25/2019</a:t>
             </a:fld>
             <a:endParaRPr/>
           </a:p>
@@ -10269,7 +10279,7 @@
               <a:pPr>
                 <a:defRPr/>
               </a:pPr>
-              <a:t>2/24/2018</a:t>
+              <a:t>2/25/2019</a:t>
             </a:fld>
             <a:endParaRPr/>
           </a:p>
@@ -10541,7 +10551,7 @@
               <a:pPr>
                 <a:defRPr/>
               </a:pPr>
-              <a:t>2/24/2018</a:t>
+              <a:t>2/25/2019</a:t>
             </a:fld>
             <a:endParaRPr/>
           </a:p>
@@ -10809,7 +10819,7 @@
               <a:pPr>
                 <a:defRPr/>
               </a:pPr>
-              <a:t>2/24/2018</a:t>
+              <a:t>2/25/2019</a:t>
             </a:fld>
             <a:endParaRPr/>
           </a:p>
@@ -10991,7 +11001,7 @@
               <a:pPr>
                 <a:defRPr/>
               </a:pPr>
-              <a:t>2/24/2018</a:t>
+              <a:t>2/25/2019</a:t>
             </a:fld>
             <a:endParaRPr/>
           </a:p>
@@ -11755,14 +11765,14 @@
           <a:lstStyle/>
           <a:p>
             <a:r>
-              <a:rPr lang="en-US" altLang="zh-CN" dirty="0">
+              <a:rPr lang="en-US" altLang="zh-CN">
                 <a:latin typeface="微软雅黑" pitchFamily="34" charset="-122"/>
                 <a:ea typeface="微软雅黑" pitchFamily="34" charset="-122"/>
               </a:rPr>
               <a:t>C</a:t>
             </a:r>
             <a:r>
-              <a:rPr lang="zh-CN" altLang="en-US" dirty="0">
+              <a:rPr lang="zh-CN" altLang="en-US">
                 <a:latin typeface="微软雅黑" pitchFamily="34" charset="-122"/>
                 <a:ea typeface="微软雅黑" pitchFamily="34" charset="-122"/>
               </a:rPr>
@@ -12904,9 +12914,7 @@
               <a:r>
                 <a:rPr lang="zh-CN" altLang="en-US" sz="3200" b="1">
                   <a:solidFill>
-                    <a:schemeClr val="tx1">
-                      <a:lumMod val="50000"/>
-                    </a:schemeClr>
+                    <a:srgbClr val="000000"/>
                   </a:solidFill>
                   <a:latin typeface="微软雅黑" pitchFamily="34" charset="-122"/>
                   <a:ea typeface="微软雅黑" pitchFamily="34" charset="-122"/>
@@ -12914,6 +12922,11 @@
                 </a:rPr>
                 <a:t>高级技术</a:t>
               </a:r>
+              <a:endParaRPr lang="zh-CN" altLang="en-US" sz="3200" b="1">
+                <a:latin typeface="微软雅黑" pitchFamily="34" charset="-122"/>
+                <a:ea typeface="微软雅黑" pitchFamily="34" charset="-122"/>
+                <a:cs typeface="Consolas" pitchFamily="49" charset="0"/>
+              </a:endParaRPr>
             </a:p>
           </p:txBody>
         </p:sp>
@@ -13153,8 +13166,8 @@
             </p:nvSpPr>
             <p:spPr bwMode="gray">
               <a:xfrm>
-                <a:off x="735" y="2323"/>
-                <a:ext cx="813" cy="349"/>
+                <a:off x="787" y="2323"/>
+                <a:ext cx="709" cy="643"/>
               </a:xfrm>
               <a:prstGeom prst="rect">
                 <a:avLst/>
@@ -13175,24 +13188,31 @@
               <a:p>
                 <a:pPr algn="ctr"/>
                 <a:r>
-                  <a:rPr lang="en-US" altLang="zh-CN" sz="3200" b="1">
+                  <a:rPr lang="en-US" altLang="zh-CN" sz="3200" b="1" dirty="0">
                     <a:solidFill>
-                      <a:schemeClr val="tx1">
-                        <a:lumMod val="50000"/>
-                      </a:schemeClr>
+                      <a:srgbClr val="000000"/>
                     </a:solidFill>
                     <a:latin typeface="Consolas" pitchFamily="49" charset="0"/>
                     <a:ea typeface="宋体" pitchFamily="2" charset="-122"/>
                     <a:cs typeface="Consolas" pitchFamily="49" charset="0"/>
                   </a:rPr>
-                  <a:t>C#/Java</a:t>
+                  <a:t>Python</a:t>
                 </a:r>
-                <a:endParaRPr lang="zh-CN" altLang="en-US" sz="3200" b="1">
-                  <a:solidFill>
-                    <a:schemeClr val="tx1">
-                      <a:lumMod val="50000"/>
-                    </a:schemeClr>
-                  </a:solidFill>
+              </a:p>
+              <a:p>
+                <a:pPr algn="ctr"/>
+                <a:r>
+                  <a:rPr lang="en-US" altLang="zh-CN" sz="3200" b="1" dirty="0">
+                    <a:solidFill>
+                      <a:srgbClr val="000000"/>
+                    </a:solidFill>
+                    <a:latin typeface="Consolas" pitchFamily="49" charset="0"/>
+                    <a:ea typeface="宋体" pitchFamily="2" charset="-122"/>
+                    <a:cs typeface="Consolas" pitchFamily="49" charset="0"/>
+                  </a:rPr>
+                  <a:t>JS</a:t>
+                </a:r>
+                <a:endParaRPr lang="zh-CN" altLang="en-US" sz="3200" b="1" dirty="0">
                   <a:latin typeface="Consolas" pitchFamily="49" charset="0"/>
                   <a:ea typeface="宋体" pitchFamily="2" charset="-122"/>
                   <a:cs typeface="Consolas" pitchFamily="49" charset="0"/>
@@ -13421,8 +13441,8 @@
           </p:nvSpPr>
           <p:spPr bwMode="gray">
             <a:xfrm>
-              <a:off x="2223369" y="1873096"/>
-              <a:ext cx="862737" cy="584775"/>
+              <a:off x="2110360" y="1873096"/>
+              <a:ext cx="1088760" cy="584775"/>
             </a:xfrm>
             <a:prstGeom prst="rect">
               <a:avLst/>
@@ -13443,24 +13463,17 @@
             <a:p>
               <a:pPr algn="ctr"/>
               <a:r>
-                <a:rPr lang="en-US" altLang="zh-CN" sz="3200" b="1">
+                <a:rPr lang="en-US" altLang="zh-CN" sz="3200" b="1" dirty="0">
                   <a:solidFill>
-                    <a:schemeClr val="tx1">
-                      <a:lumMod val="50000"/>
-                    </a:schemeClr>
+                    <a:srgbClr val="000000"/>
                   </a:solidFill>
                   <a:latin typeface="Consolas" pitchFamily="49" charset="0"/>
                   <a:ea typeface="宋体" pitchFamily="2" charset="-122"/>
                   <a:cs typeface="Consolas" pitchFamily="49" charset="0"/>
                 </a:rPr>
-                <a:t>C++</a:t>
+                <a:t>JAVA</a:t>
               </a:r>
-              <a:endParaRPr lang="en-US" altLang="zh-CN" sz="3200">
-                <a:solidFill>
-                  <a:schemeClr val="tx1">
-                    <a:lumMod val="50000"/>
-                  </a:schemeClr>
-                </a:solidFill>
+              <a:endParaRPr lang="en-US" altLang="zh-CN" sz="3200" dirty="0">
                 <a:latin typeface="Consolas" pitchFamily="49" charset="0"/>
                 <a:ea typeface="宋体" pitchFamily="2" charset="-122"/>
                 <a:cs typeface="Consolas" pitchFamily="49" charset="0"/>
@@ -13765,49 +13778,6 @@
           <a:chExt cx="0" cy="0"/>
         </a:xfrm>
       </p:grpSpPr>
-      <p:pic>
-        <p:nvPicPr>
-          <p:cNvPr id="3" name="图片 2"/>
-          <p:cNvPicPr>
-            <a:picLocks noChangeAspect="1"/>
-          </p:cNvPicPr>
-          <p:nvPr/>
-        </p:nvPicPr>
-        <p:blipFill>
-          <a:blip r:embed="rId2">
-            <a:extLst>
-              <a:ext uri="{BEBA8EAE-BF5A-486C-A8C5-ECC9F3942E4B}">
-                <a14:imgProps xmlns:a14="http://schemas.microsoft.com/office/drawing/2010/main">
-                  <a14:imgLayer r:embed="rId3">
-                    <a14:imgEffect>
-                      <a14:sharpenSoften amount="50000"/>
-                    </a14:imgEffect>
-                  </a14:imgLayer>
-                </a14:imgProps>
-              </a:ext>
-            </a:extLst>
-          </a:blip>
-          <a:stretch>
-            <a:fillRect/>
-          </a:stretch>
-        </p:blipFill>
-        <p:spPr>
-          <a:xfrm>
-            <a:off x="1269875" y="1340767"/>
-            <a:ext cx="10229305" cy="4482505"/>
-          </a:xfrm>
-          <a:prstGeom prst="rect">
-            <a:avLst/>
-          </a:prstGeom>
-          <a:effectLst>
-            <a:outerShdw blurRad="50800" dist="38100" dir="2700000" algn="tl" rotWithShape="0">
-              <a:prstClr val="black">
-                <a:alpha val="40000"/>
-              </a:prstClr>
-            </a:outerShdw>
-          </a:effectLst>
-        </p:spPr>
-      </p:pic>
       <p:sp>
         <p:nvSpPr>
           <p:cNvPr id="2" name="标题 1"/>
@@ -13891,16 +13861,48 @@
           </a:p>
         </p:txBody>
       </p:sp>
+      <p:pic>
+        <p:nvPicPr>
+          <p:cNvPr id="5" name="图片 4">
+            <a:extLst>
+              <a:ext uri="{FF2B5EF4-FFF2-40B4-BE49-F238E27FC236}">
+                <a16:creationId xmlns:a16="http://schemas.microsoft.com/office/drawing/2014/main" id="{C99ADAE0-257D-4DF7-A74E-4BD85B34AB98}"/>
+              </a:ext>
+            </a:extLst>
+          </p:cNvPr>
+          <p:cNvPicPr>
+            <a:picLocks noChangeAspect="1"/>
+          </p:cNvPicPr>
+          <p:nvPr/>
+        </p:nvPicPr>
+        <p:blipFill>
+          <a:blip r:embed="rId2"/>
+          <a:stretch>
+            <a:fillRect/>
+          </a:stretch>
+        </p:blipFill>
+        <p:spPr>
+          <a:xfrm>
+            <a:off x="1171667" y="1259882"/>
+            <a:ext cx="11017158" cy="4770537"/>
+          </a:xfrm>
+          <a:prstGeom prst="rect">
+            <a:avLst/>
+          </a:prstGeom>
+        </p:spPr>
+      </p:pic>
       <p:cxnSp>
         <p:nvCxnSpPr>
           <p:cNvPr id="6" name="直接连接符 5"/>
-          <p:cNvCxnSpPr/>
+          <p:cNvCxnSpPr>
+            <a:cxnSpLocks/>
+          </p:cNvCxnSpPr>
           <p:nvPr/>
         </p:nvCxnSpPr>
         <p:spPr>
           <a:xfrm>
             <a:off x="1139332" y="2491308"/>
-            <a:ext cx="10571704" cy="1588"/>
+            <a:ext cx="11049493" cy="0"/>
           </a:xfrm>
           <a:prstGeom prst="line">
             <a:avLst/>
@@ -14047,49 +14049,6 @@
           <a:chExt cx="0" cy="0"/>
         </a:xfrm>
       </p:grpSpPr>
-      <p:pic>
-        <p:nvPicPr>
-          <p:cNvPr id="3" name="图片 2"/>
-          <p:cNvPicPr>
-            <a:picLocks noChangeAspect="1"/>
-          </p:cNvPicPr>
-          <p:nvPr/>
-        </p:nvPicPr>
-        <p:blipFill>
-          <a:blip r:embed="rId2">
-            <a:extLst>
-              <a:ext uri="{BEBA8EAE-BF5A-486C-A8C5-ECC9F3942E4B}">
-                <a14:imgProps xmlns:a14="http://schemas.microsoft.com/office/drawing/2010/main">
-                  <a14:imgLayer r:embed="rId3">
-                    <a14:imgEffect>
-                      <a14:sharpenSoften amount="50000"/>
-                    </a14:imgEffect>
-                  </a14:imgLayer>
-                </a14:imgProps>
-              </a:ext>
-            </a:extLst>
-          </a:blip>
-          <a:stretch>
-            <a:fillRect/>
-          </a:stretch>
-        </p:blipFill>
-        <p:spPr>
-          <a:xfrm>
-            <a:off x="1730898" y="1074281"/>
-            <a:ext cx="9646095" cy="4658203"/>
-          </a:xfrm>
-          <a:prstGeom prst="rect">
-            <a:avLst/>
-          </a:prstGeom>
-          <a:effectLst>
-            <a:outerShdw blurRad="50800" dist="38100" dir="2700000" algn="tl" rotWithShape="0">
-              <a:prstClr val="black">
-                <a:alpha val="40000"/>
-              </a:prstClr>
-            </a:outerShdw>
-          </a:effectLst>
-        </p:spPr>
-      </p:pic>
       <p:sp>
         <p:nvSpPr>
           <p:cNvPr id="2" name="标题 1"/>
@@ -14117,7 +14076,7 @@
       <p:sp>
         <p:nvSpPr>
           <p:cNvPr id="5" name="Rectangle 8">
-            <a:hlinkClick r:id="rId4"/>
+            <a:hlinkClick r:id="rId2"/>
           </p:cNvPr>
           <p:cNvSpPr txBox="1">
             <a:spLocks noChangeArrowheads="1"/>
@@ -14157,7 +14116,7 @@
               <a:defRPr/>
             </a:pPr>
             <a:r>
-              <a:rPr lang="en-US" altLang="zh-CN" sz="3200">
+              <a:rPr lang="en-US" altLang="zh-CN" sz="3200" dirty="0">
                 <a:solidFill>
                   <a:schemeClr val="accent2">
                     <a:lumMod val="50000"/>
@@ -14185,40 +14144,6 @@
               <a:ea typeface="宋体" pitchFamily="2" charset="-122"/>
               <a:cs typeface="Consolas" pitchFamily="49" charset="0"/>
             </a:endParaRPr>
-          </a:p>
-        </p:txBody>
-      </p:sp>
-      <p:sp>
-        <p:nvSpPr>
-          <p:cNvPr id="6" name="Line 9"/>
-          <p:cNvSpPr>
-            <a:spLocks noChangeShapeType="1"/>
-          </p:cNvSpPr>
-          <p:nvPr/>
-        </p:nvSpPr>
-        <p:spPr bwMode="auto">
-          <a:xfrm>
-            <a:off x="1485901" y="2780928"/>
-            <a:ext cx="834934" cy="219444"/>
-          </a:xfrm>
-          <a:prstGeom prst="line">
-            <a:avLst/>
-          </a:prstGeom>
-          <a:noFill/>
-          <a:ln w="44450">
-            <a:solidFill>
-              <a:srgbClr val="FF0000"/>
-            </a:solidFill>
-            <a:round/>
-            <a:headEnd/>
-            <a:tailEnd type="triangle" w="med" len="med"/>
-          </a:ln>
-        </p:spPr>
-        <p:txBody>
-          <a:bodyPr/>
-          <a:lstStyle/>
-          <a:p>
-            <a:endParaRPr lang="zh-CN" altLang="en-US"/>
           </a:p>
         </p:txBody>
       </p:sp>
@@ -14282,6 +14207,70 @@
               <a:latin typeface="微软雅黑" pitchFamily="34" charset="-122"/>
               <a:ea typeface="微软雅黑" pitchFamily="34" charset="-122"/>
             </a:endParaRPr>
+          </a:p>
+        </p:txBody>
+      </p:sp>
+      <p:pic>
+        <p:nvPicPr>
+          <p:cNvPr id="4" name="图片 3">
+            <a:extLst>
+              <a:ext uri="{FF2B5EF4-FFF2-40B4-BE49-F238E27FC236}">
+                <a16:creationId xmlns:a16="http://schemas.microsoft.com/office/drawing/2014/main" id="{B42FE9DF-898E-469D-A5FB-967CFB31720E}"/>
+              </a:ext>
+            </a:extLst>
+          </p:cNvPr>
+          <p:cNvPicPr>
+            <a:picLocks noChangeAspect="1"/>
+          </p:cNvPicPr>
+          <p:nvPr/>
+        </p:nvPicPr>
+        <p:blipFill>
+          <a:blip r:embed="rId3"/>
+          <a:stretch>
+            <a:fillRect/>
+          </a:stretch>
+        </p:blipFill>
+        <p:spPr>
+          <a:xfrm>
+            <a:off x="1638397" y="1196752"/>
+            <a:ext cx="9568583" cy="4571762"/>
+          </a:xfrm>
+          <a:prstGeom prst="rect">
+            <a:avLst/>
+          </a:prstGeom>
+        </p:spPr>
+      </p:pic>
+      <p:sp>
+        <p:nvSpPr>
+          <p:cNvPr id="6" name="Line 9"/>
+          <p:cNvSpPr>
+            <a:spLocks noChangeShapeType="1"/>
+          </p:cNvSpPr>
+          <p:nvPr/>
+        </p:nvSpPr>
+        <p:spPr bwMode="auto">
+          <a:xfrm>
+            <a:off x="1485901" y="2780928"/>
+            <a:ext cx="834934" cy="219444"/>
+          </a:xfrm>
+          <a:prstGeom prst="line">
+            <a:avLst/>
+          </a:prstGeom>
+          <a:noFill/>
+          <a:ln w="44450">
+            <a:solidFill>
+              <a:srgbClr val="FF0000"/>
+            </a:solidFill>
+            <a:round/>
+            <a:headEnd/>
+            <a:tailEnd type="triangle" w="med" len="med"/>
+          </a:ln>
+        </p:spPr>
+        <p:txBody>
+          <a:bodyPr/>
+          <a:lstStyle/>
+          <a:p>
+            <a:endParaRPr lang="zh-CN" altLang="en-US"/>
           </a:p>
         </p:txBody>
       </p:sp>
@@ -15022,7 +15011,7 @@
         </p:nvSpPr>
         <p:spPr bwMode="auto">
           <a:xfrm>
-            <a:off x="477788" y="1196752"/>
+            <a:off x="847972" y="1484784"/>
             <a:ext cx="10287000" cy="4464496"/>
           </a:xfrm>
           <a:prstGeom prst="rect">
@@ -15238,13 +15227,13 @@
           </a:lstStyle>
           <a:p>
             <a:r>
-              <a:rPr lang="zh-CN" altLang="en-US" sz="3200">
+              <a:rPr lang="zh-CN" altLang="en-US">
                 <a:latin typeface="微软雅黑" pitchFamily="34" charset="-122"/>
                 <a:ea typeface="微软雅黑" pitchFamily="34" charset="-122"/>
               </a:rPr>
               <a:t>课程教材及参考资料：</a:t>
             </a:r>
-            <a:endParaRPr lang="en-US" altLang="zh-CN" sz="3200">
+            <a:endParaRPr lang="en-US" altLang="zh-CN">
               <a:latin typeface="微软雅黑" pitchFamily="34" charset="-122"/>
               <a:ea typeface="微软雅黑" pitchFamily="34" charset="-122"/>
             </a:endParaRPr>
@@ -15252,20 +15241,20 @@
           <a:p>
             <a:pPr lvl="1"/>
             <a:r>
-              <a:rPr lang="en-US" altLang="zh-CN" sz="2800" b="1">
+              <a:rPr lang="en-US" altLang="zh-CN" b="1">
                 <a:latin typeface="微软雅黑" pitchFamily="34" charset="-122"/>
                 <a:ea typeface="微软雅黑" pitchFamily="34" charset="-122"/>
               </a:rPr>
               <a:t>C</a:t>
             </a:r>
             <a:r>
-              <a:rPr lang="zh-CN" altLang="en-US" sz="2800" b="1">
+              <a:rPr lang="zh-CN" altLang="en-US" b="1">
                 <a:latin typeface="微软雅黑" pitchFamily="34" charset="-122"/>
                 <a:ea typeface="微软雅黑" pitchFamily="34" charset="-122"/>
               </a:rPr>
               <a:t>语言程序设计</a:t>
             </a:r>
-            <a:endParaRPr lang="en-US" altLang="zh-CN" sz="2800">
+            <a:endParaRPr lang="en-US" altLang="zh-CN">
               <a:latin typeface="微软雅黑" pitchFamily="34" charset="-122"/>
               <a:ea typeface="微软雅黑" pitchFamily="34" charset="-122"/>
             </a:endParaRPr>
@@ -15273,7 +15262,7 @@
           <a:p>
             <a:pPr lvl="1"/>
             <a:r>
-              <a:rPr lang="en-US" altLang="zh-CN" sz="2800" b="1">
+              <a:rPr lang="en-US" altLang="zh-CN" b="1">
                 <a:latin typeface="微软雅黑" pitchFamily="34" charset="-122"/>
                 <a:ea typeface="微软雅黑" pitchFamily="34" charset="-122"/>
               </a:rPr>
@@ -15283,13 +15272,13 @@
           <a:p>
             <a:pPr lvl="1"/>
             <a:r>
-              <a:rPr lang="zh-CN" altLang="en-US" sz="2800">
+              <a:rPr lang="zh-CN" altLang="en-US">
                 <a:latin typeface="微软雅黑" pitchFamily="34" charset="-122"/>
                 <a:ea typeface="微软雅黑" pitchFamily="34" charset="-122"/>
               </a:rPr>
               <a:t>高质量程序设计指南</a:t>
             </a:r>
-            <a:endParaRPr lang="en-US" altLang="zh-CN" sz="2800">
+            <a:endParaRPr lang="en-US" altLang="zh-CN">
               <a:latin typeface="微软雅黑" pitchFamily="34" charset="-122"/>
               <a:ea typeface="微软雅黑" pitchFamily="34" charset="-122"/>
             </a:endParaRPr>
@@ -15297,20 +15286,20 @@
           <a:p>
             <a:pPr lvl="1"/>
             <a:r>
-              <a:rPr lang="en-US" altLang="zh-CN" sz="2800">
+              <a:rPr lang="en-US" altLang="zh-CN">
                 <a:latin typeface="微软雅黑" pitchFamily="34" charset="-122"/>
                 <a:ea typeface="微软雅黑" pitchFamily="34" charset="-122"/>
               </a:rPr>
               <a:t>C</a:t>
             </a:r>
             <a:r>
-              <a:rPr lang="zh-CN" altLang="en-US" sz="2800">
+              <a:rPr lang="zh-CN" altLang="en-US">
                 <a:latin typeface="微软雅黑" pitchFamily="34" charset="-122"/>
                 <a:ea typeface="微软雅黑" pitchFamily="34" charset="-122"/>
               </a:rPr>
               <a:t>专家编程</a:t>
             </a:r>
-            <a:endParaRPr lang="en-US" altLang="zh-CN" sz="2800">
+            <a:endParaRPr lang="en-US" altLang="zh-CN">
               <a:latin typeface="微软雅黑" pitchFamily="34" charset="-122"/>
               <a:ea typeface="微软雅黑" pitchFamily="34" charset="-122"/>
             </a:endParaRPr>
@@ -15318,20 +15307,20 @@
           <a:p>
             <a:pPr lvl="1"/>
             <a:r>
-              <a:rPr lang="en-US" altLang="zh-CN" sz="2800">
+              <a:rPr lang="en-US" altLang="zh-CN">
                 <a:latin typeface="微软雅黑" pitchFamily="34" charset="-122"/>
                 <a:ea typeface="微软雅黑" pitchFamily="34" charset="-122"/>
               </a:rPr>
               <a:t>C</a:t>
             </a:r>
             <a:r>
-              <a:rPr lang="zh-CN" altLang="en-US" sz="2800">
+              <a:rPr lang="zh-CN" altLang="en-US">
                 <a:latin typeface="微软雅黑" pitchFamily="34" charset="-122"/>
                 <a:ea typeface="微软雅黑" pitchFamily="34" charset="-122"/>
               </a:rPr>
               <a:t>和指针</a:t>
             </a:r>
-            <a:endParaRPr lang="en-US" altLang="zh-CN" sz="2800">
+            <a:endParaRPr lang="en-US" altLang="zh-CN">
               <a:latin typeface="微软雅黑" pitchFamily="34" charset="-122"/>
               <a:ea typeface="微软雅黑" pitchFamily="34" charset="-122"/>
             </a:endParaRPr>
@@ -15339,20 +15328,20 @@
           <a:p>
             <a:pPr lvl="1"/>
             <a:r>
-              <a:rPr lang="en-US" altLang="zh-CN" sz="2800">
+              <a:rPr lang="en-US" altLang="zh-CN">
                 <a:latin typeface="微软雅黑" pitchFamily="34" charset="-122"/>
                 <a:ea typeface="微软雅黑" pitchFamily="34" charset="-122"/>
               </a:rPr>
               <a:t>C</a:t>
             </a:r>
             <a:r>
-              <a:rPr lang="zh-CN" altLang="en-US" sz="2800">
+              <a:rPr lang="zh-CN" altLang="en-US">
                 <a:latin typeface="微软雅黑" pitchFamily="34" charset="-122"/>
                 <a:ea typeface="微软雅黑" pitchFamily="34" charset="-122"/>
               </a:rPr>
               <a:t>语言百度贴吧</a:t>
             </a:r>
-            <a:endParaRPr lang="en-US" altLang="zh-CN" sz="2800" dirty="0">
+            <a:endParaRPr lang="en-US" altLang="zh-CN" dirty="0">
               <a:latin typeface="微软雅黑" pitchFamily="34" charset="-122"/>
               <a:ea typeface="微软雅黑" pitchFamily="34" charset="-122"/>
             </a:endParaRPr>
@@ -15867,7 +15856,7 @@
           <p:nvPr>
             <p:extLst>
               <p:ext uri="{D42A27DB-BD31-4B8C-83A1-F6EECF244321}">
-                <p14:modId xmlns:p14="http://schemas.microsoft.com/office/powerpoint/2010/main" val="2954485605"/>
+                <p14:modId xmlns:p14="http://schemas.microsoft.com/office/powerpoint/2010/main" val="803046678"/>
               </p:ext>
             </p:extLst>
           </p:nvPr>
@@ -16111,7 +16100,7 @@
               <a:buNone/>
             </a:pPr>
             <a:r>
-              <a:rPr lang="en-US" altLang="zh-CN" sz="5400" b="1" spc="600">
+              <a:rPr lang="en-US" altLang="zh-CN" sz="5400" b="1" spc="600" dirty="0">
                 <a:solidFill>
                   <a:schemeClr val="bg2">
                     <a:lumMod val="50000"/>
@@ -16120,10 +16109,10 @@
                 <a:latin typeface="微软雅黑" pitchFamily="34" charset="-122"/>
                 <a:ea typeface="微软雅黑" pitchFamily="34" charset="-122"/>
               </a:rPr>
-              <a:t>3.5</a:t>
+              <a:t>4</a:t>
             </a:r>
             <a:r>
-              <a:rPr lang="zh-CN" altLang="en-US" sz="5400" b="1" spc="600">
+              <a:rPr lang="zh-CN" altLang="en-US" sz="5400" b="1" spc="600" dirty="0">
                 <a:solidFill>
                   <a:schemeClr val="bg2">
                     <a:lumMod val="50000"/>
@@ -16134,7 +16123,7 @@
               </a:rPr>
               <a:t>学分</a:t>
             </a:r>
-            <a:endParaRPr lang="en-US" altLang="zh-CN" sz="5400" b="1" spc="600">
+            <a:endParaRPr lang="en-US" altLang="zh-CN" sz="5400" b="1" spc="600" dirty="0">
               <a:solidFill>
                 <a:schemeClr val="bg2">
                   <a:lumMod val="50000"/>

</xml_diff>